<commit_message>
pending changes never checked in
</commit_message>
<xml_diff>
--- a/Main/Docs/AddressBookDemo.pptx
+++ b/Main/Docs/AddressBookDemo.pptx
@@ -226,7 +226,7 @@
             <a:fld id="{3842907C-D0AA-4C58-9F94-58B40AD65B29}" type="datetimeFigureOut">
               <a:rPr lang="en-US" smtClean="0"/>
               <a:pPr/>
-              <a:t>9/11/2013</a:t>
+              <a:t>9/12/2013</a:t>
             </a:fld>
             <a:endParaRPr lang="en-US"/>
           </a:p>
@@ -2690,7 +2690,7 @@
             <a:fld id="{E6E13C79-1C97-4B32-B2AE-1A69C169643E}" type="datetime2">
               <a:rPr lang="en-US" smtClean="0"/>
               <a:pPr/>
-              <a:t>Wednesday, September 11, 2013</a:t>
+              <a:t>Thursday, September 12, 2013</a:t>
             </a:fld>
             <a:endParaRPr lang="en-US" dirty="0">
               <a:solidFill>
@@ -2902,7 +2902,7 @@
             <a:fld id="{D10E14BF-C004-4398-9186-5EE680724D95}" type="datetime2">
               <a:rPr lang="en-US" smtClean="0"/>
               <a:pPr/>
-              <a:t>Wednesday, September 11, 2013</a:t>
+              <a:t>Thursday, September 12, 2013</a:t>
             </a:fld>
             <a:endParaRPr lang="en-US"/>
           </a:p>
@@ -3095,7 +3095,7 @@
             <a:fld id="{D10E14BF-C004-4398-9186-5EE680724D95}" type="datetime2">
               <a:rPr lang="en-US" smtClean="0"/>
               <a:pPr/>
-              <a:t>Wednesday, September 11, 2013</a:t>
+              <a:t>Thursday, September 12, 2013</a:t>
             </a:fld>
             <a:endParaRPr lang="en-US"/>
           </a:p>
@@ -3253,7 +3253,7 @@
             <a:fld id="{227FEF5B-F2CC-4EC5-8F1F-29A8BF9EFFA9}" type="datetime2">
               <a:rPr lang="en-US" smtClean="0"/>
               <a:pPr/>
-              <a:t>Wednesday, September 11, 2013</a:t>
+              <a:t>Thursday, September 12, 2013</a:t>
             </a:fld>
             <a:endParaRPr lang="en-US"/>
           </a:p>
@@ -3510,7 +3510,7 @@
             <a:fld id="{5F4709C1-563D-4D9C-B702-B64C84A5A174}" type="datetime2">
               <a:rPr lang="en-US" smtClean="0"/>
               <a:pPr/>
-              <a:t>Wednesday, September 11, 2013</a:t>
+              <a:t>Thursday, September 12, 2013</a:t>
             </a:fld>
             <a:endParaRPr lang="en-US"/>
           </a:p>
@@ -3921,7 +3921,7 @@
             <a:fld id="{2E8303D9-A6EB-41FB-BF22-3F49E470997E}" type="datetime2">
               <a:rPr lang="en-US" smtClean="0"/>
               <a:pPr/>
-              <a:t>Wednesday, September 11, 2013</a:t>
+              <a:t>Thursday, September 12, 2013</a:t>
             </a:fld>
             <a:endParaRPr lang="en-US"/>
           </a:p>
@@ -4369,7 +4369,7 @@
             <a:fld id="{89BB0534-5698-4F62-9CFE-5DE61A073E78}" type="datetime2">
               <a:rPr lang="en-US" smtClean="0"/>
               <a:pPr/>
-              <a:t>Wednesday, September 11, 2013</a:t>
+              <a:t>Thursday, September 12, 2013</a:t>
             </a:fld>
             <a:endParaRPr lang="en-US"/>
           </a:p>
@@ -4472,7 +4472,7 @@
             <a:fld id="{084827A3-B249-4F87-AB1A-1E06AC1AA2A4}" type="datetime2">
               <a:rPr lang="en-US" smtClean="0"/>
               <a:pPr/>
-              <a:t>Wednesday, September 11, 2013</a:t>
+              <a:t>Thursday, September 12, 2013</a:t>
             </a:fld>
             <a:endParaRPr lang="en-US"/>
           </a:p>
@@ -4595,7 +4595,7 @@
             <a:fld id="{B1546142-29B2-49CC-BCC6-A3AD70B4960E}" type="datetime2">
               <a:rPr lang="en-US" smtClean="0"/>
               <a:pPr/>
-              <a:t>Wednesday, September 11, 2013</a:t>
+              <a:t>Thursday, September 12, 2013</a:t>
             </a:fld>
             <a:endParaRPr lang="en-US"/>
           </a:p>
@@ -4871,7 +4871,7 @@
             <a:fld id="{E86C4691-4882-40A8-AF62-8CF6A18D40B2}" type="datetime2">
               <a:rPr lang="en-US" smtClean="0"/>
               <a:pPr/>
-              <a:t>Wednesday, September 11, 2013</a:t>
+              <a:t>Thursday, September 12, 2013</a:t>
             </a:fld>
             <a:endParaRPr lang="en-US"/>
           </a:p>
@@ -5078,7 +5078,7 @@
             <a:fld id="{61C6776A-4DEC-47EE-8A49-2C150ECB5465}" type="datetime2">
               <a:rPr lang="en-US" smtClean="0"/>
               <a:pPr/>
-              <a:t>Wednesday, September 11, 2013</a:t>
+              <a:t>Thursday, September 12, 2013</a:t>
             </a:fld>
             <a:endParaRPr lang="en-US">
               <a:solidFill>
@@ -6201,7 +6201,7 @@
             <a:fld id="{D10E14BF-C004-4398-9186-5EE680724D95}" type="datetime2">
               <a:rPr lang="en-US" smtClean="0"/>
               <a:pPr/>
-              <a:t>Wednesday, September 11, 2013</a:t>
+              <a:t>Thursday, September 12, 2013</a:t>
             </a:fld>
             <a:endParaRPr lang="en-US" sz="1000" dirty="0">
               <a:solidFill>
@@ -6745,13 +6745,6 @@
           <a:lstStyle/>
           <a:p>
             <a:r>
-              <a:rPr lang="en-US" dirty="0" err="1" smtClean="0"/>
-              <a:t>AddressBook.Lib</a:t>
-            </a:r>
-            <a:endParaRPr lang="en-US" dirty="0" smtClean="0"/>
-          </a:p>
-          <a:p>
-            <a:r>
               <a:rPr lang="en-US" dirty="0" smtClean="0"/>
               <a:t>ADO.NET</a:t>
             </a:r>
@@ -6841,17 +6834,6 @@
         <p:txBody>
           <a:bodyPr/>
           <a:lstStyle/>
-          <a:p>
-            <a:r>
-              <a:rPr lang="en-US" dirty="0" err="1" smtClean="0"/>
-              <a:t>AddressBook.Lib</a:t>
-            </a:r>
-            <a:r>
-              <a:rPr lang="en-US" dirty="0" err="1" smtClean="0"/>
-              <a:t>.BLL</a:t>
-            </a:r>
-            <a:endParaRPr lang="en-US" dirty="0" smtClean="0"/>
-          </a:p>
           <a:p>
             <a:r>
               <a:rPr lang="en-US" dirty="0" smtClean="0"/>
@@ -7765,16 +7747,11 @@
               <a:rPr lang="en-US" dirty="0" smtClean="0"/>
               <a:t>Database</a:t>
             </a:r>
-            <a:endParaRPr lang="en-US" dirty="0" smtClean="0"/>
-          </a:p>
-          <a:p>
-            <a:r>
-              <a:rPr lang="en-US" dirty="0" smtClean="0"/>
-              <a:t>Domain </a:t>
-            </a:r>
-            <a:r>
-              <a:rPr lang="en-US" dirty="0" smtClean="0"/>
-              <a:t>Model</a:t>
+          </a:p>
+          <a:p>
+            <a:r>
+              <a:rPr lang="en-US" dirty="0" smtClean="0"/>
+              <a:t>Domain Model</a:t>
             </a:r>
           </a:p>
           <a:p>
@@ -7788,18 +7765,12 @@
               <a:rPr lang="en-US" dirty="0" smtClean="0"/>
               <a:t>Business Logic Layer</a:t>
             </a:r>
-            <a:endParaRPr lang="en-US" dirty="0" smtClean="0"/>
-          </a:p>
-          <a:p>
-            <a:r>
-              <a:rPr lang="en-US" dirty="0" smtClean="0"/>
-              <a:t>Design </a:t>
-            </a:r>
-            <a:r>
-              <a:rPr lang="en-US" dirty="0" smtClean="0"/>
-              <a:t>Patterns</a:t>
-            </a:r>
-            <a:endParaRPr lang="en-US" dirty="0" smtClean="0"/>
+          </a:p>
+          <a:p>
+            <a:r>
+              <a:rPr lang="en-US" dirty="0" smtClean="0"/>
+              <a:t>Design Patterns</a:t>
+            </a:r>
           </a:p>
         </p:txBody>
       </p:sp>

</xml_diff>